<commit_message>
atualiza slides sessão 01
</commit_message>
<xml_diff>
--- a/sessoes-01-02/sessao-01.pptx
+++ b/sessoes-01-02/sessao-01.pptx
@@ -1830,7 +1830,7 @@
   <p:cSld>
     <p:spTree>
       <p:nvGrpSpPr>
-        <p:cNvPr id="132" name="Shape 132"/>
+        <p:cNvPr id="133" name="Shape 133"/>
         <p:cNvGrpSpPr/>
         <p:nvPr/>
       </p:nvGrpSpPr>
@@ -1844,7 +1844,7 @@
       </p:grpSpPr>
       <p:sp>
         <p:nvSpPr>
-          <p:cNvPr id="133" name="Google Shape;133;p10:notes"/>
+          <p:cNvPr id="134" name="Google Shape;134;p10:notes"/>
           <p:cNvSpPr/>
           <p:nvPr>
             <p:ph idx="2" type="sldImg"/>
@@ -1889,7 +1889,7 @@
       </p:sp>
       <p:sp>
         <p:nvSpPr>
-          <p:cNvPr id="134" name="Google Shape;134;p10:notes"/>
+          <p:cNvPr id="135" name="Google Shape;135;p10:notes"/>
           <p:cNvSpPr txBox="1"/>
           <p:nvPr>
             <p:ph idx="1" type="body"/>
@@ -1940,7 +1940,7 @@
       </p:sp>
       <p:sp>
         <p:nvSpPr>
-          <p:cNvPr id="135" name="Google Shape;135;p10:notes"/>
+          <p:cNvPr id="136" name="Google Shape;136;p10:notes"/>
           <p:cNvSpPr txBox="1"/>
           <p:nvPr>
             <p:ph idx="12" type="sldNum"/>
@@ -2003,7 +2003,7 @@
   <p:cSld>
     <p:spTree>
       <p:nvGrpSpPr>
-        <p:cNvPr id="140" name="Shape 140"/>
+        <p:cNvPr id="141" name="Shape 141"/>
         <p:cNvGrpSpPr/>
         <p:nvPr/>
       </p:nvGrpSpPr>
@@ -2017,7 +2017,7 @@
       </p:grpSpPr>
       <p:sp>
         <p:nvSpPr>
-          <p:cNvPr id="141" name="Google Shape;141;p11:notes"/>
+          <p:cNvPr id="142" name="Google Shape;142;p11:notes"/>
           <p:cNvSpPr/>
           <p:nvPr>
             <p:ph idx="2" type="sldImg"/>
@@ -2062,7 +2062,7 @@
       </p:sp>
       <p:sp>
         <p:nvSpPr>
-          <p:cNvPr id="142" name="Google Shape;142;p11:notes"/>
+          <p:cNvPr id="143" name="Google Shape;143;p11:notes"/>
           <p:cNvSpPr txBox="1"/>
           <p:nvPr>
             <p:ph idx="1" type="body"/>
@@ -2113,7 +2113,7 @@
       </p:sp>
       <p:sp>
         <p:nvSpPr>
-          <p:cNvPr id="143" name="Google Shape;143;p11:notes"/>
+          <p:cNvPr id="144" name="Google Shape;144;p11:notes"/>
           <p:cNvSpPr txBox="1"/>
           <p:nvPr>
             <p:ph idx="12" type="sldNum"/>
@@ -2176,7 +2176,7 @@
   <p:cSld>
     <p:spTree>
       <p:nvGrpSpPr>
-        <p:cNvPr id="148" name="Shape 148"/>
+        <p:cNvPr id="149" name="Shape 149"/>
         <p:cNvGrpSpPr/>
         <p:nvPr/>
       </p:nvGrpSpPr>
@@ -2190,7 +2190,7 @@
       </p:grpSpPr>
       <p:sp>
         <p:nvSpPr>
-          <p:cNvPr id="149" name="Google Shape;149;p12:notes"/>
+          <p:cNvPr id="150" name="Google Shape;150;p12:notes"/>
           <p:cNvSpPr/>
           <p:nvPr>
             <p:ph idx="2" type="sldImg"/>
@@ -2235,7 +2235,7 @@
       </p:sp>
       <p:sp>
         <p:nvSpPr>
-          <p:cNvPr id="150" name="Google Shape;150;p12:notes"/>
+          <p:cNvPr id="151" name="Google Shape;151;p12:notes"/>
           <p:cNvSpPr txBox="1"/>
           <p:nvPr>
             <p:ph idx="1" type="body"/>
@@ -2286,7 +2286,7 @@
       </p:sp>
       <p:sp>
         <p:nvSpPr>
-          <p:cNvPr id="151" name="Google Shape;151;p12:notes"/>
+          <p:cNvPr id="152" name="Google Shape;152;p12:notes"/>
           <p:cNvSpPr txBox="1"/>
           <p:nvPr>
             <p:ph idx="12" type="sldNum"/>
@@ -2349,7 +2349,7 @@
   <p:cSld>
     <p:spTree>
       <p:nvGrpSpPr>
-        <p:cNvPr id="156" name="Shape 156"/>
+        <p:cNvPr id="157" name="Shape 157"/>
         <p:cNvGrpSpPr/>
         <p:nvPr/>
       </p:nvGrpSpPr>
@@ -2363,7 +2363,7 @@
       </p:grpSpPr>
       <p:sp>
         <p:nvSpPr>
-          <p:cNvPr id="157" name="Google Shape;157;p13:notes"/>
+          <p:cNvPr id="158" name="Google Shape;158;p13:notes"/>
           <p:cNvSpPr/>
           <p:nvPr>
             <p:ph idx="2" type="sldImg"/>
@@ -2408,7 +2408,7 @@
       </p:sp>
       <p:sp>
         <p:nvSpPr>
-          <p:cNvPr id="158" name="Google Shape;158;p13:notes"/>
+          <p:cNvPr id="159" name="Google Shape;159;p13:notes"/>
           <p:cNvSpPr txBox="1"/>
           <p:nvPr>
             <p:ph idx="1" type="body"/>
@@ -2459,7 +2459,7 @@
       </p:sp>
       <p:sp>
         <p:nvSpPr>
-          <p:cNvPr id="159" name="Google Shape;159;p13:notes"/>
+          <p:cNvPr id="160" name="Google Shape;160;p13:notes"/>
           <p:cNvSpPr txBox="1"/>
           <p:nvPr>
             <p:ph idx="12" type="sldNum"/>
@@ -2522,7 +2522,7 @@
   <p:cSld>
     <p:spTree>
       <p:nvGrpSpPr>
-        <p:cNvPr id="164" name="Shape 164"/>
+        <p:cNvPr id="165" name="Shape 165"/>
         <p:cNvGrpSpPr/>
         <p:nvPr/>
       </p:nvGrpSpPr>
@@ -2536,7 +2536,7 @@
       </p:grpSpPr>
       <p:sp>
         <p:nvSpPr>
-          <p:cNvPr id="165" name="Google Shape;165;p14:notes"/>
+          <p:cNvPr id="166" name="Google Shape;166;p14:notes"/>
           <p:cNvSpPr/>
           <p:nvPr>
             <p:ph idx="2" type="sldImg"/>
@@ -2581,7 +2581,7 @@
       </p:sp>
       <p:sp>
         <p:nvSpPr>
-          <p:cNvPr id="166" name="Google Shape;166;p14:notes"/>
+          <p:cNvPr id="167" name="Google Shape;167;p14:notes"/>
           <p:cNvSpPr txBox="1"/>
           <p:nvPr>
             <p:ph idx="1" type="body"/>
@@ -2632,7 +2632,7 @@
       </p:sp>
       <p:sp>
         <p:nvSpPr>
-          <p:cNvPr id="167" name="Google Shape;167;p14:notes"/>
+          <p:cNvPr id="168" name="Google Shape;168;p14:notes"/>
           <p:cNvSpPr txBox="1"/>
           <p:nvPr>
             <p:ph idx="12" type="sldNum"/>
@@ -2695,7 +2695,7 @@
   <p:cSld>
     <p:spTree>
       <p:nvGrpSpPr>
-        <p:cNvPr id="172" name="Shape 172"/>
+        <p:cNvPr id="173" name="Shape 173"/>
         <p:cNvGrpSpPr/>
         <p:nvPr/>
       </p:nvGrpSpPr>
@@ -2709,7 +2709,7 @@
       </p:grpSpPr>
       <p:sp>
         <p:nvSpPr>
-          <p:cNvPr id="173" name="Google Shape;173;p15:notes"/>
+          <p:cNvPr id="174" name="Google Shape;174;p15:notes"/>
           <p:cNvSpPr/>
           <p:nvPr>
             <p:ph idx="2" type="sldImg"/>
@@ -2754,7 +2754,7 @@
       </p:sp>
       <p:sp>
         <p:nvSpPr>
-          <p:cNvPr id="174" name="Google Shape;174;p15:notes"/>
+          <p:cNvPr id="175" name="Google Shape;175;p15:notes"/>
           <p:cNvSpPr txBox="1"/>
           <p:nvPr>
             <p:ph idx="1" type="body"/>
@@ -2805,7 +2805,7 @@
       </p:sp>
       <p:sp>
         <p:nvSpPr>
-          <p:cNvPr id="175" name="Google Shape;175;p15:notes"/>
+          <p:cNvPr id="176" name="Google Shape;176;p15:notes"/>
           <p:cNvSpPr txBox="1"/>
           <p:nvPr>
             <p:ph idx="12" type="sldNum"/>
@@ -2868,7 +2868,7 @@
   <p:cSld>
     <p:spTree>
       <p:nvGrpSpPr>
-        <p:cNvPr id="180" name="Shape 180"/>
+        <p:cNvPr id="181" name="Shape 181"/>
         <p:cNvGrpSpPr/>
         <p:nvPr/>
       </p:nvGrpSpPr>
@@ -2882,7 +2882,7 @@
       </p:grpSpPr>
       <p:sp>
         <p:nvSpPr>
-          <p:cNvPr id="181" name="Google Shape;181;p16:notes"/>
+          <p:cNvPr id="182" name="Google Shape;182;p16:notes"/>
           <p:cNvSpPr/>
           <p:nvPr>
             <p:ph idx="2" type="sldImg"/>
@@ -2927,7 +2927,7 @@
       </p:sp>
       <p:sp>
         <p:nvSpPr>
-          <p:cNvPr id="182" name="Google Shape;182;p16:notes"/>
+          <p:cNvPr id="183" name="Google Shape;183;p16:notes"/>
           <p:cNvSpPr txBox="1"/>
           <p:nvPr>
             <p:ph idx="1" type="body"/>
@@ -2978,7 +2978,7 @@
       </p:sp>
       <p:sp>
         <p:nvSpPr>
-          <p:cNvPr id="183" name="Google Shape;183;p16:notes"/>
+          <p:cNvPr id="184" name="Google Shape;184;p16:notes"/>
           <p:cNvSpPr txBox="1"/>
           <p:nvPr>
             <p:ph idx="12" type="sldNum"/>
@@ -3041,7 +3041,7 @@
   <p:cSld>
     <p:spTree>
       <p:nvGrpSpPr>
-        <p:cNvPr id="188" name="Shape 188"/>
+        <p:cNvPr id="189" name="Shape 189"/>
         <p:cNvGrpSpPr/>
         <p:nvPr/>
       </p:nvGrpSpPr>
@@ -3055,7 +3055,7 @@
       </p:grpSpPr>
       <p:sp>
         <p:nvSpPr>
-          <p:cNvPr id="189" name="Google Shape;189;p17:notes"/>
+          <p:cNvPr id="190" name="Google Shape;190;p17:notes"/>
           <p:cNvSpPr/>
           <p:nvPr>
             <p:ph idx="2" type="sldImg"/>
@@ -3100,7 +3100,7 @@
       </p:sp>
       <p:sp>
         <p:nvSpPr>
-          <p:cNvPr id="190" name="Google Shape;190;p17:notes"/>
+          <p:cNvPr id="191" name="Google Shape;191;p17:notes"/>
           <p:cNvSpPr txBox="1"/>
           <p:nvPr>
             <p:ph idx="1" type="body"/>
@@ -3151,7 +3151,7 @@
       </p:sp>
       <p:sp>
         <p:nvSpPr>
-          <p:cNvPr id="191" name="Google Shape;191;p17:notes"/>
+          <p:cNvPr id="192" name="Google Shape;192;p17:notes"/>
           <p:cNvSpPr txBox="1"/>
           <p:nvPr>
             <p:ph idx="12" type="sldNum"/>
@@ -3214,7 +3214,7 @@
   <p:cSld>
     <p:spTree>
       <p:nvGrpSpPr>
-        <p:cNvPr id="196" name="Shape 196"/>
+        <p:cNvPr id="197" name="Shape 197"/>
         <p:cNvGrpSpPr/>
         <p:nvPr/>
       </p:nvGrpSpPr>
@@ -3228,7 +3228,7 @@
       </p:grpSpPr>
       <p:sp>
         <p:nvSpPr>
-          <p:cNvPr id="197" name="Google Shape;197;p18:notes"/>
+          <p:cNvPr id="198" name="Google Shape;198;p18:notes"/>
           <p:cNvSpPr/>
           <p:nvPr>
             <p:ph idx="2" type="sldImg"/>
@@ -3273,7 +3273,7 @@
       </p:sp>
       <p:sp>
         <p:nvSpPr>
-          <p:cNvPr id="198" name="Google Shape;198;p18:notes"/>
+          <p:cNvPr id="199" name="Google Shape;199;p18:notes"/>
           <p:cNvSpPr txBox="1"/>
           <p:nvPr>
             <p:ph idx="1" type="body"/>
@@ -3324,7 +3324,7 @@
       </p:sp>
       <p:sp>
         <p:nvSpPr>
-          <p:cNvPr id="199" name="Google Shape;199;p18:notes"/>
+          <p:cNvPr id="200" name="Google Shape;200;p18:notes"/>
           <p:cNvSpPr txBox="1"/>
           <p:nvPr>
             <p:ph idx="12" type="sldNum"/>
@@ -3387,7 +3387,7 @@
   <p:cSld>
     <p:spTree>
       <p:nvGrpSpPr>
-        <p:cNvPr id="204" name="Shape 204"/>
+        <p:cNvPr id="205" name="Shape 205"/>
         <p:cNvGrpSpPr/>
         <p:nvPr/>
       </p:nvGrpSpPr>
@@ -3401,7 +3401,7 @@
       </p:grpSpPr>
       <p:sp>
         <p:nvSpPr>
-          <p:cNvPr id="205" name="Google Shape;205;p19:notes"/>
+          <p:cNvPr id="206" name="Google Shape;206;p19:notes"/>
           <p:cNvSpPr/>
           <p:nvPr>
             <p:ph idx="2" type="sldImg"/>
@@ -3446,7 +3446,7 @@
       </p:sp>
       <p:sp>
         <p:nvSpPr>
-          <p:cNvPr id="206" name="Google Shape;206;p19:notes"/>
+          <p:cNvPr id="207" name="Google Shape;207;p19:notes"/>
           <p:cNvSpPr txBox="1"/>
           <p:nvPr>
             <p:ph idx="1" type="body"/>
@@ -3497,7 +3497,7 @@
       </p:sp>
       <p:sp>
         <p:nvSpPr>
-          <p:cNvPr id="207" name="Google Shape;207;p19:notes"/>
+          <p:cNvPr id="208" name="Google Shape;208;p19:notes"/>
           <p:cNvSpPr txBox="1"/>
           <p:nvPr>
             <p:ph idx="12" type="sldNum"/>
@@ -3733,7 +3733,7 @@
   <p:cSld>
     <p:spTree>
       <p:nvGrpSpPr>
-        <p:cNvPr id="213" name="Shape 213"/>
+        <p:cNvPr id="214" name="Shape 214"/>
         <p:cNvGrpSpPr/>
         <p:nvPr/>
       </p:nvGrpSpPr>
@@ -3747,7 +3747,7 @@
       </p:grpSpPr>
       <p:sp>
         <p:nvSpPr>
-          <p:cNvPr id="214" name="Google Shape;214;p20:notes"/>
+          <p:cNvPr id="215" name="Google Shape;215;p20:notes"/>
           <p:cNvSpPr/>
           <p:nvPr>
             <p:ph idx="2" type="sldImg"/>
@@ -3792,7 +3792,7 @@
       </p:sp>
       <p:sp>
         <p:nvSpPr>
-          <p:cNvPr id="215" name="Google Shape;215;p20:notes"/>
+          <p:cNvPr id="216" name="Google Shape;216;p20:notes"/>
           <p:cNvSpPr txBox="1"/>
           <p:nvPr>
             <p:ph idx="1" type="body"/>
@@ -3843,7 +3843,7 @@
       </p:sp>
       <p:sp>
         <p:nvSpPr>
-          <p:cNvPr id="216" name="Google Shape;216;p20:notes"/>
+          <p:cNvPr id="217" name="Google Shape;217;p20:notes"/>
           <p:cNvSpPr txBox="1"/>
           <p:nvPr>
             <p:ph idx="12" type="sldNum"/>
@@ -3906,7 +3906,7 @@
   <p:cSld>
     <p:spTree>
       <p:nvGrpSpPr>
-        <p:cNvPr id="221" name="Shape 221"/>
+        <p:cNvPr id="222" name="Shape 222"/>
         <p:cNvGrpSpPr/>
         <p:nvPr/>
       </p:nvGrpSpPr>
@@ -3920,7 +3920,7 @@
       </p:grpSpPr>
       <p:sp>
         <p:nvSpPr>
-          <p:cNvPr id="222" name="Google Shape;222;p21:notes"/>
+          <p:cNvPr id="223" name="Google Shape;223;p21:notes"/>
           <p:cNvSpPr/>
           <p:nvPr>
             <p:ph idx="2" type="sldImg"/>
@@ -3965,7 +3965,7 @@
       </p:sp>
       <p:sp>
         <p:nvSpPr>
-          <p:cNvPr id="223" name="Google Shape;223;p21:notes"/>
+          <p:cNvPr id="224" name="Google Shape;224;p21:notes"/>
           <p:cNvSpPr txBox="1"/>
           <p:nvPr>
             <p:ph idx="1" type="body"/>
@@ -4016,7 +4016,7 @@
       </p:sp>
       <p:sp>
         <p:nvSpPr>
-          <p:cNvPr id="224" name="Google Shape;224;p21:notes"/>
+          <p:cNvPr id="225" name="Google Shape;225;p21:notes"/>
           <p:cNvSpPr txBox="1"/>
           <p:nvPr>
             <p:ph idx="12" type="sldNum"/>
@@ -4079,7 +4079,7 @@
   <p:cSld>
     <p:spTree>
       <p:nvGrpSpPr>
-        <p:cNvPr id="229" name="Shape 229"/>
+        <p:cNvPr id="230" name="Shape 230"/>
         <p:cNvGrpSpPr/>
         <p:nvPr/>
       </p:nvGrpSpPr>
@@ -4093,7 +4093,7 @@
       </p:grpSpPr>
       <p:sp>
         <p:nvSpPr>
-          <p:cNvPr id="230" name="Google Shape;230;p22:notes"/>
+          <p:cNvPr id="231" name="Google Shape;231;p22:notes"/>
           <p:cNvSpPr/>
           <p:nvPr>
             <p:ph idx="2" type="sldImg"/>
@@ -4138,7 +4138,7 @@
       </p:sp>
       <p:sp>
         <p:nvSpPr>
-          <p:cNvPr id="231" name="Google Shape;231;p22:notes"/>
+          <p:cNvPr id="232" name="Google Shape;232;p22:notes"/>
           <p:cNvSpPr txBox="1"/>
           <p:nvPr>
             <p:ph idx="1" type="body"/>
@@ -4189,7 +4189,7 @@
       </p:sp>
       <p:sp>
         <p:nvSpPr>
-          <p:cNvPr id="232" name="Google Shape;232;p22:notes"/>
+          <p:cNvPr id="233" name="Google Shape;233;p22:notes"/>
           <p:cNvSpPr txBox="1"/>
           <p:nvPr>
             <p:ph idx="12" type="sldNum"/>
@@ -4252,7 +4252,7 @@
   <p:cSld>
     <p:spTree>
       <p:nvGrpSpPr>
-        <p:cNvPr id="237" name="Shape 237"/>
+        <p:cNvPr id="238" name="Shape 238"/>
         <p:cNvGrpSpPr/>
         <p:nvPr/>
       </p:nvGrpSpPr>
@@ -4266,7 +4266,7 @@
       </p:grpSpPr>
       <p:sp>
         <p:nvSpPr>
-          <p:cNvPr id="238" name="Google Shape;238;p23:notes"/>
+          <p:cNvPr id="239" name="Google Shape;239;p23:notes"/>
           <p:cNvSpPr/>
           <p:nvPr>
             <p:ph idx="2" type="sldImg"/>
@@ -4311,7 +4311,7 @@
       </p:sp>
       <p:sp>
         <p:nvSpPr>
-          <p:cNvPr id="239" name="Google Shape;239;p23:notes"/>
+          <p:cNvPr id="240" name="Google Shape;240;p23:notes"/>
           <p:cNvSpPr txBox="1"/>
           <p:nvPr>
             <p:ph idx="1" type="body"/>
@@ -4362,7 +4362,7 @@
       </p:sp>
       <p:sp>
         <p:nvSpPr>
-          <p:cNvPr id="240" name="Google Shape;240;p23:notes"/>
+          <p:cNvPr id="241" name="Google Shape;241;p23:notes"/>
           <p:cNvSpPr txBox="1"/>
           <p:nvPr>
             <p:ph idx="12" type="sldNum"/>
@@ -4425,7 +4425,7 @@
   <p:cSld>
     <p:spTree>
       <p:nvGrpSpPr>
-        <p:cNvPr id="245" name="Shape 245"/>
+        <p:cNvPr id="246" name="Shape 246"/>
         <p:cNvGrpSpPr/>
         <p:nvPr/>
       </p:nvGrpSpPr>
@@ -4439,7 +4439,7 @@
       </p:grpSpPr>
       <p:sp>
         <p:nvSpPr>
-          <p:cNvPr id="246" name="Google Shape;246;p24:notes"/>
+          <p:cNvPr id="247" name="Google Shape;247;p24:notes"/>
           <p:cNvSpPr/>
           <p:nvPr>
             <p:ph idx="2" type="sldImg"/>
@@ -4484,7 +4484,7 @@
       </p:sp>
       <p:sp>
         <p:nvSpPr>
-          <p:cNvPr id="247" name="Google Shape;247;p24:notes"/>
+          <p:cNvPr id="248" name="Google Shape;248;p24:notes"/>
           <p:cNvSpPr txBox="1"/>
           <p:nvPr>
             <p:ph idx="1" type="body"/>
@@ -4535,7 +4535,7 @@
       </p:sp>
       <p:sp>
         <p:nvSpPr>
-          <p:cNvPr id="248" name="Google Shape;248;p24:notes"/>
+          <p:cNvPr id="249" name="Google Shape;249;p24:notes"/>
           <p:cNvSpPr txBox="1"/>
           <p:nvPr>
             <p:ph idx="12" type="sldNum"/>
@@ -5290,7 +5290,7 @@
   <p:cSld>
     <p:spTree>
       <p:nvGrpSpPr>
-        <p:cNvPr id="107" name="Shape 107"/>
+        <p:cNvPr id="108" name="Shape 108"/>
         <p:cNvGrpSpPr/>
         <p:nvPr/>
       </p:nvGrpSpPr>
@@ -5304,7 +5304,7 @@
       </p:grpSpPr>
       <p:sp>
         <p:nvSpPr>
-          <p:cNvPr id="108" name="Google Shape;108;p7:notes"/>
+          <p:cNvPr id="109" name="Google Shape;109;p7:notes"/>
           <p:cNvSpPr/>
           <p:nvPr>
             <p:ph idx="2" type="sldImg"/>
@@ -5349,7 +5349,7 @@
       </p:sp>
       <p:sp>
         <p:nvSpPr>
-          <p:cNvPr id="109" name="Google Shape;109;p7:notes"/>
+          <p:cNvPr id="110" name="Google Shape;110;p7:notes"/>
           <p:cNvSpPr txBox="1"/>
           <p:nvPr>
             <p:ph idx="1" type="body"/>
@@ -5400,7 +5400,7 @@
       </p:sp>
       <p:sp>
         <p:nvSpPr>
-          <p:cNvPr id="110" name="Google Shape;110;p7:notes"/>
+          <p:cNvPr id="111" name="Google Shape;111;p7:notes"/>
           <p:cNvSpPr txBox="1"/>
           <p:nvPr>
             <p:ph idx="12" type="sldNum"/>
@@ -5463,7 +5463,7 @@
   <p:cSld>
     <p:spTree>
       <p:nvGrpSpPr>
-        <p:cNvPr id="115" name="Shape 115"/>
+        <p:cNvPr id="116" name="Shape 116"/>
         <p:cNvGrpSpPr/>
         <p:nvPr/>
       </p:nvGrpSpPr>
@@ -5477,7 +5477,7 @@
       </p:grpSpPr>
       <p:sp>
         <p:nvSpPr>
-          <p:cNvPr id="116" name="Google Shape;116;p8:notes"/>
+          <p:cNvPr id="117" name="Google Shape;117;p8:notes"/>
           <p:cNvSpPr/>
           <p:nvPr>
             <p:ph idx="2" type="sldImg"/>
@@ -5522,7 +5522,7 @@
       </p:sp>
       <p:sp>
         <p:nvSpPr>
-          <p:cNvPr id="117" name="Google Shape;117;p8:notes"/>
+          <p:cNvPr id="118" name="Google Shape;118;p8:notes"/>
           <p:cNvSpPr txBox="1"/>
           <p:nvPr>
             <p:ph idx="1" type="body"/>
@@ -5573,7 +5573,7 @@
       </p:sp>
       <p:sp>
         <p:nvSpPr>
-          <p:cNvPr id="118" name="Google Shape;118;p8:notes"/>
+          <p:cNvPr id="119" name="Google Shape;119;p8:notes"/>
           <p:cNvSpPr txBox="1"/>
           <p:nvPr>
             <p:ph idx="12" type="sldNum"/>
@@ -5636,7 +5636,7 @@
   <p:cSld>
     <p:spTree>
       <p:nvGrpSpPr>
-        <p:cNvPr id="124" name="Shape 124"/>
+        <p:cNvPr id="125" name="Shape 125"/>
         <p:cNvGrpSpPr/>
         <p:nvPr/>
       </p:nvGrpSpPr>
@@ -5650,7 +5650,7 @@
       </p:grpSpPr>
       <p:sp>
         <p:nvSpPr>
-          <p:cNvPr id="125" name="Google Shape;125;p9:notes"/>
+          <p:cNvPr id="126" name="Google Shape;126;p9:notes"/>
           <p:cNvSpPr/>
           <p:nvPr>
             <p:ph idx="2" type="sldImg"/>
@@ -5695,7 +5695,7 @@
       </p:sp>
       <p:sp>
         <p:nvSpPr>
-          <p:cNvPr id="126" name="Google Shape;126;p9:notes"/>
+          <p:cNvPr id="127" name="Google Shape;127;p9:notes"/>
           <p:cNvSpPr txBox="1"/>
           <p:nvPr>
             <p:ph idx="1" type="body"/>
@@ -5746,7 +5746,7 @@
       </p:sp>
       <p:sp>
         <p:nvSpPr>
-          <p:cNvPr id="127" name="Google Shape;127;p9:notes"/>
+          <p:cNvPr id="128" name="Google Shape;128;p9:notes"/>
           <p:cNvSpPr txBox="1"/>
           <p:nvPr>
             <p:ph idx="12" type="sldNum"/>
@@ -14928,7 +14928,7 @@
   <p:cSld>
     <p:spTree>
       <p:nvGrpSpPr>
-        <p:cNvPr id="136" name="Shape 136"/>
+        <p:cNvPr id="137" name="Shape 137"/>
         <p:cNvGrpSpPr/>
         <p:nvPr/>
       </p:nvGrpSpPr>
@@ -14942,7 +14942,7 @@
       </p:grpSpPr>
       <p:sp>
         <p:nvSpPr>
-          <p:cNvPr id="137" name="Google Shape;137;p23"/>
+          <p:cNvPr id="138" name="Google Shape;138;p23"/>
           <p:cNvSpPr txBox="1"/>
           <p:nvPr>
             <p:ph type="title"/>
@@ -15000,7 +15000,7 @@
       </p:sp>
       <p:sp>
         <p:nvSpPr>
-          <p:cNvPr id="138" name="Google Shape;138;p23"/>
+          <p:cNvPr id="139" name="Google Shape;139;p23"/>
           <p:cNvSpPr txBox="1"/>
           <p:nvPr>
             <p:ph idx="1" type="body"/>
@@ -15297,7 +15297,7 @@
       </p:sp>
       <p:pic>
         <p:nvPicPr>
-          <p:cNvPr id="139" name="Google Shape;139;p23"/>
+          <p:cNvPr id="140" name="Google Shape;140;p23"/>
           <p:cNvPicPr preferRelativeResize="0"/>
           <p:nvPr/>
         </p:nvPicPr>
@@ -15341,7 +15341,7 @@
   <p:cSld>
     <p:spTree>
       <p:nvGrpSpPr>
-        <p:cNvPr id="144" name="Shape 144"/>
+        <p:cNvPr id="145" name="Shape 145"/>
         <p:cNvGrpSpPr/>
         <p:nvPr/>
       </p:nvGrpSpPr>
@@ -15355,7 +15355,7 @@
       </p:grpSpPr>
       <p:sp>
         <p:nvSpPr>
-          <p:cNvPr id="145" name="Google Shape;145;p24"/>
+          <p:cNvPr id="146" name="Google Shape;146;p24"/>
           <p:cNvSpPr txBox="1"/>
           <p:nvPr>
             <p:ph type="title"/>
@@ -15413,7 +15413,7 @@
       </p:sp>
       <p:sp>
         <p:nvSpPr>
-          <p:cNvPr id="146" name="Google Shape;146;p24"/>
+          <p:cNvPr id="147" name="Google Shape;147;p24"/>
           <p:cNvSpPr txBox="1"/>
           <p:nvPr>
             <p:ph idx="1" type="body"/>
@@ -15637,7 +15637,7 @@
       </p:sp>
       <p:pic>
         <p:nvPicPr>
-          <p:cNvPr id="147" name="Google Shape;147;p24"/>
+          <p:cNvPr id="148" name="Google Shape;148;p24"/>
           <p:cNvPicPr preferRelativeResize="0"/>
           <p:nvPr/>
         </p:nvPicPr>
@@ -15681,7 +15681,7 @@
   <p:cSld>
     <p:spTree>
       <p:nvGrpSpPr>
-        <p:cNvPr id="152" name="Shape 152"/>
+        <p:cNvPr id="153" name="Shape 153"/>
         <p:cNvGrpSpPr/>
         <p:nvPr/>
       </p:nvGrpSpPr>
@@ -15695,7 +15695,7 @@
       </p:grpSpPr>
       <p:sp>
         <p:nvSpPr>
-          <p:cNvPr id="153" name="Google Shape;153;p25"/>
+          <p:cNvPr id="154" name="Google Shape;154;p25"/>
           <p:cNvSpPr txBox="1"/>
           <p:nvPr>
             <p:ph type="title"/>
@@ -15753,7 +15753,7 @@
       </p:sp>
       <p:sp>
         <p:nvSpPr>
-          <p:cNvPr id="154" name="Google Shape;154;p25"/>
+          <p:cNvPr id="155" name="Google Shape;155;p25"/>
           <p:cNvSpPr txBox="1"/>
           <p:nvPr>
             <p:ph idx="1" type="body"/>
@@ -15977,7 +15977,7 @@
       </p:sp>
       <p:pic>
         <p:nvPicPr>
-          <p:cNvPr id="155" name="Google Shape;155;p25"/>
+          <p:cNvPr id="156" name="Google Shape;156;p25"/>
           <p:cNvPicPr preferRelativeResize="0"/>
           <p:nvPr/>
         </p:nvPicPr>
@@ -16021,7 +16021,7 @@
   <p:cSld>
     <p:spTree>
       <p:nvGrpSpPr>
-        <p:cNvPr id="160" name="Shape 160"/>
+        <p:cNvPr id="161" name="Shape 161"/>
         <p:cNvGrpSpPr/>
         <p:nvPr/>
       </p:nvGrpSpPr>
@@ -16035,7 +16035,7 @@
       </p:grpSpPr>
       <p:sp>
         <p:nvSpPr>
-          <p:cNvPr id="161" name="Google Shape;161;p26"/>
+          <p:cNvPr id="162" name="Google Shape;162;p26"/>
           <p:cNvSpPr txBox="1"/>
           <p:nvPr>
             <p:ph type="title"/>
@@ -16093,7 +16093,7 @@
       </p:sp>
       <p:sp>
         <p:nvSpPr>
-          <p:cNvPr id="162" name="Google Shape;162;p26"/>
+          <p:cNvPr id="163" name="Google Shape;163;p26"/>
           <p:cNvSpPr txBox="1"/>
           <p:nvPr>
             <p:ph idx="1" type="body"/>
@@ -16262,7 +16262,7 @@
       </p:sp>
       <p:pic>
         <p:nvPicPr>
-          <p:cNvPr id="163" name="Google Shape;163;p26"/>
+          <p:cNvPr id="164" name="Google Shape;164;p26"/>
           <p:cNvPicPr preferRelativeResize="0"/>
           <p:nvPr/>
         </p:nvPicPr>
@@ -16306,7 +16306,7 @@
   <p:cSld>
     <p:spTree>
       <p:nvGrpSpPr>
-        <p:cNvPr id="168" name="Shape 168"/>
+        <p:cNvPr id="169" name="Shape 169"/>
         <p:cNvGrpSpPr/>
         <p:nvPr/>
       </p:nvGrpSpPr>
@@ -16320,7 +16320,7 @@
       </p:grpSpPr>
       <p:sp>
         <p:nvSpPr>
-          <p:cNvPr id="169" name="Google Shape;169;p27"/>
+          <p:cNvPr id="170" name="Google Shape;170;p27"/>
           <p:cNvSpPr txBox="1"/>
           <p:nvPr>
             <p:ph type="title"/>
@@ -16378,7 +16378,7 @@
       </p:sp>
       <p:sp>
         <p:nvSpPr>
-          <p:cNvPr id="170" name="Google Shape;170;p27"/>
+          <p:cNvPr id="171" name="Google Shape;171;p27"/>
           <p:cNvSpPr txBox="1"/>
           <p:nvPr>
             <p:ph idx="1" type="body"/>
@@ -16571,7 +16571,7 @@
       </p:sp>
       <p:pic>
         <p:nvPicPr>
-          <p:cNvPr id="171" name="Google Shape;171;p27"/>
+          <p:cNvPr id="172" name="Google Shape;172;p27"/>
           <p:cNvPicPr preferRelativeResize="0"/>
           <p:nvPr/>
         </p:nvPicPr>
@@ -16615,7 +16615,7 @@
   <p:cSld>
     <p:spTree>
       <p:nvGrpSpPr>
-        <p:cNvPr id="176" name="Shape 176"/>
+        <p:cNvPr id="177" name="Shape 177"/>
         <p:cNvGrpSpPr/>
         <p:nvPr/>
       </p:nvGrpSpPr>
@@ -16629,7 +16629,7 @@
       </p:grpSpPr>
       <p:sp>
         <p:nvSpPr>
-          <p:cNvPr id="177" name="Google Shape;177;p28"/>
+          <p:cNvPr id="178" name="Google Shape;178;p28"/>
           <p:cNvSpPr txBox="1"/>
           <p:nvPr>
             <p:ph type="title"/>
@@ -16687,7 +16687,7 @@
       </p:sp>
       <p:sp>
         <p:nvSpPr>
-          <p:cNvPr id="178" name="Google Shape;178;p28"/>
+          <p:cNvPr id="179" name="Google Shape;179;p28"/>
           <p:cNvSpPr txBox="1"/>
           <p:nvPr>
             <p:ph idx="1" type="body"/>
@@ -16902,7 +16902,7 @@
       </p:sp>
       <p:pic>
         <p:nvPicPr>
-          <p:cNvPr id="179" name="Google Shape;179;p28"/>
+          <p:cNvPr id="180" name="Google Shape;180;p28"/>
           <p:cNvPicPr preferRelativeResize="0"/>
           <p:nvPr/>
         </p:nvPicPr>
@@ -16946,7 +16946,7 @@
   <p:cSld>
     <p:spTree>
       <p:nvGrpSpPr>
-        <p:cNvPr id="184" name="Shape 184"/>
+        <p:cNvPr id="185" name="Shape 185"/>
         <p:cNvGrpSpPr/>
         <p:nvPr/>
       </p:nvGrpSpPr>
@@ -16960,7 +16960,7 @@
       </p:grpSpPr>
       <p:sp>
         <p:nvSpPr>
-          <p:cNvPr id="185" name="Google Shape;185;p29"/>
+          <p:cNvPr id="186" name="Google Shape;186;p29"/>
           <p:cNvSpPr txBox="1"/>
           <p:nvPr>
             <p:ph type="title"/>
@@ -17048,7 +17048,7 @@
       </p:sp>
       <p:sp>
         <p:nvSpPr>
-          <p:cNvPr id="186" name="Google Shape;186;p29"/>
+          <p:cNvPr id="187" name="Google Shape;187;p29"/>
           <p:cNvSpPr txBox="1"/>
           <p:nvPr>
             <p:ph idx="1" type="body"/>
@@ -17236,7 +17236,7 @@
       </p:sp>
       <p:pic>
         <p:nvPicPr>
-          <p:cNvPr id="187" name="Google Shape;187;p29"/>
+          <p:cNvPr id="188" name="Google Shape;188;p29"/>
           <p:cNvPicPr preferRelativeResize="0"/>
           <p:nvPr/>
         </p:nvPicPr>
@@ -17280,7 +17280,7 @@
   <p:cSld>
     <p:spTree>
       <p:nvGrpSpPr>
-        <p:cNvPr id="192" name="Shape 192"/>
+        <p:cNvPr id="193" name="Shape 193"/>
         <p:cNvGrpSpPr/>
         <p:nvPr/>
       </p:nvGrpSpPr>
@@ -17294,7 +17294,7 @@
       </p:grpSpPr>
       <p:sp>
         <p:nvSpPr>
-          <p:cNvPr id="193" name="Google Shape;193;p30"/>
+          <p:cNvPr id="194" name="Google Shape;194;p30"/>
           <p:cNvSpPr txBox="1"/>
           <p:nvPr>
             <p:ph type="title"/>
@@ -17352,7 +17352,7 @@
       </p:sp>
       <p:sp>
         <p:nvSpPr>
-          <p:cNvPr id="194" name="Google Shape;194;p30"/>
+          <p:cNvPr id="195" name="Google Shape;195;p30"/>
           <p:cNvSpPr txBox="1"/>
           <p:nvPr>
             <p:ph idx="1" type="body"/>
@@ -17686,7 +17686,7 @@
       </p:sp>
       <p:pic>
         <p:nvPicPr>
-          <p:cNvPr id="195" name="Google Shape;195;p30"/>
+          <p:cNvPr id="196" name="Google Shape;196;p30"/>
           <p:cNvPicPr preferRelativeResize="0"/>
           <p:nvPr/>
         </p:nvPicPr>
@@ -17730,7 +17730,7 @@
   <p:cSld>
     <p:spTree>
       <p:nvGrpSpPr>
-        <p:cNvPr id="200" name="Shape 200"/>
+        <p:cNvPr id="201" name="Shape 201"/>
         <p:cNvGrpSpPr/>
         <p:nvPr/>
       </p:nvGrpSpPr>
@@ -17744,7 +17744,7 @@
       </p:grpSpPr>
       <p:sp>
         <p:nvSpPr>
-          <p:cNvPr id="201" name="Google Shape;201;p31"/>
+          <p:cNvPr id="202" name="Google Shape;202;p31"/>
           <p:cNvSpPr txBox="1"/>
           <p:nvPr>
             <p:ph type="title"/>
@@ -17802,7 +17802,7 @@
       </p:sp>
       <p:sp>
         <p:nvSpPr>
-          <p:cNvPr id="202" name="Google Shape;202;p31"/>
+          <p:cNvPr id="203" name="Google Shape;203;p31"/>
           <p:cNvSpPr txBox="1"/>
           <p:nvPr>
             <p:ph idx="1" type="body"/>
@@ -18045,7 +18045,7 @@
       </p:sp>
       <p:pic>
         <p:nvPicPr>
-          <p:cNvPr id="203" name="Google Shape;203;p31"/>
+          <p:cNvPr id="204" name="Google Shape;204;p31"/>
           <p:cNvPicPr preferRelativeResize="0"/>
           <p:nvPr/>
         </p:nvPicPr>
@@ -18089,7 +18089,7 @@
   <p:cSld>
     <p:spTree>
       <p:nvGrpSpPr>
-        <p:cNvPr id="208" name="Shape 208"/>
+        <p:cNvPr id="209" name="Shape 209"/>
         <p:cNvGrpSpPr/>
         <p:nvPr/>
       </p:nvGrpSpPr>
@@ -18103,7 +18103,7 @@
       </p:grpSpPr>
       <p:sp>
         <p:nvSpPr>
-          <p:cNvPr id="209" name="Google Shape;209;p32"/>
+          <p:cNvPr id="210" name="Google Shape;210;p32"/>
           <p:cNvSpPr txBox="1"/>
           <p:nvPr>
             <p:ph type="title"/>
@@ -18191,7 +18191,7 @@
       </p:sp>
       <p:sp>
         <p:nvSpPr>
-          <p:cNvPr id="210" name="Google Shape;210;p32"/>
+          <p:cNvPr id="211" name="Google Shape;211;p32"/>
           <p:cNvSpPr txBox="1"/>
           <p:nvPr>
             <p:ph idx="1" type="body"/>
@@ -18257,7 +18257,7 @@
       </p:sp>
       <p:pic>
         <p:nvPicPr>
-          <p:cNvPr descr="Screenshot from 2017-03-29 03-08-38.png" id="211" name="Google Shape;211;p32"/>
+          <p:cNvPr descr="Screenshot from 2017-03-29 03-08-38.png" id="212" name="Google Shape;212;p32"/>
           <p:cNvPicPr preferRelativeResize="0"/>
           <p:nvPr/>
         </p:nvPicPr>
@@ -18284,7 +18284,7 @@
       </p:pic>
       <p:pic>
         <p:nvPicPr>
-          <p:cNvPr id="212" name="Google Shape;212;p32"/>
+          <p:cNvPr id="213" name="Google Shape;213;p32"/>
           <p:cNvPicPr preferRelativeResize="0"/>
           <p:nvPr/>
         </p:nvPicPr>
@@ -18830,7 +18830,7 @@
   <p:cSld>
     <p:spTree>
       <p:nvGrpSpPr>
-        <p:cNvPr id="217" name="Shape 217"/>
+        <p:cNvPr id="218" name="Shape 218"/>
         <p:cNvGrpSpPr/>
         <p:nvPr/>
       </p:nvGrpSpPr>
@@ -18844,7 +18844,7 @@
       </p:grpSpPr>
       <p:sp>
         <p:nvSpPr>
-          <p:cNvPr id="218" name="Google Shape;218;p33"/>
+          <p:cNvPr id="219" name="Google Shape;219;p33"/>
           <p:cNvSpPr txBox="1"/>
           <p:nvPr>
             <p:ph type="title"/>
@@ -18932,7 +18932,7 @@
       </p:sp>
       <p:sp>
         <p:nvSpPr>
-          <p:cNvPr id="219" name="Google Shape;219;p33"/>
+          <p:cNvPr id="220" name="Google Shape;220;p33"/>
           <p:cNvSpPr txBox="1"/>
           <p:nvPr>
             <p:ph idx="1" type="body"/>
@@ -19280,7 +19280,7 @@
       </p:sp>
       <p:pic>
         <p:nvPicPr>
-          <p:cNvPr id="220" name="Google Shape;220;p33"/>
+          <p:cNvPr id="221" name="Google Shape;221;p33"/>
           <p:cNvPicPr preferRelativeResize="0"/>
           <p:nvPr/>
         </p:nvPicPr>
@@ -19324,7 +19324,7 @@
   <p:cSld>
     <p:spTree>
       <p:nvGrpSpPr>
-        <p:cNvPr id="225" name="Shape 225"/>
+        <p:cNvPr id="226" name="Shape 226"/>
         <p:cNvGrpSpPr/>
         <p:nvPr/>
       </p:nvGrpSpPr>
@@ -19338,7 +19338,7 @@
       </p:grpSpPr>
       <p:sp>
         <p:nvSpPr>
-          <p:cNvPr id="226" name="Google Shape;226;p34"/>
+          <p:cNvPr id="227" name="Google Shape;227;p34"/>
           <p:cNvSpPr txBox="1"/>
           <p:nvPr>
             <p:ph type="title"/>
@@ -19426,7 +19426,7 @@
       </p:sp>
       <p:sp>
         <p:nvSpPr>
-          <p:cNvPr id="227" name="Google Shape;227;p34"/>
+          <p:cNvPr id="228" name="Google Shape;228;p34"/>
           <p:cNvSpPr txBox="1"/>
           <p:nvPr>
             <p:ph idx="1" type="body"/>
@@ -19614,7 +19614,7 @@
       </p:sp>
       <p:pic>
         <p:nvPicPr>
-          <p:cNvPr id="228" name="Google Shape;228;p34"/>
+          <p:cNvPr id="229" name="Google Shape;229;p34"/>
           <p:cNvPicPr preferRelativeResize="0"/>
           <p:nvPr/>
         </p:nvPicPr>
@@ -19658,7 +19658,7 @@
   <p:cSld>
     <p:spTree>
       <p:nvGrpSpPr>
-        <p:cNvPr id="233" name="Shape 233"/>
+        <p:cNvPr id="234" name="Shape 234"/>
         <p:cNvGrpSpPr/>
         <p:nvPr/>
       </p:nvGrpSpPr>
@@ -19672,7 +19672,7 @@
       </p:grpSpPr>
       <p:sp>
         <p:nvSpPr>
-          <p:cNvPr id="234" name="Google Shape;234;p35"/>
+          <p:cNvPr id="235" name="Google Shape;235;p35"/>
           <p:cNvSpPr txBox="1"/>
           <p:nvPr>
             <p:ph type="title"/>
@@ -19730,7 +19730,7 @@
       </p:sp>
       <p:sp>
         <p:nvSpPr>
-          <p:cNvPr id="235" name="Google Shape;235;p35"/>
+          <p:cNvPr id="236" name="Google Shape;236;p35"/>
           <p:cNvSpPr txBox="1"/>
           <p:nvPr>
             <p:ph idx="1" type="body"/>
@@ -20014,7 +20014,7 @@
       </p:sp>
       <p:pic>
         <p:nvPicPr>
-          <p:cNvPr id="236" name="Google Shape;236;p35"/>
+          <p:cNvPr id="237" name="Google Shape;237;p35"/>
           <p:cNvPicPr preferRelativeResize="0"/>
           <p:nvPr/>
         </p:nvPicPr>
@@ -20058,7 +20058,7 @@
   <p:cSld>
     <p:spTree>
       <p:nvGrpSpPr>
-        <p:cNvPr id="241" name="Shape 241"/>
+        <p:cNvPr id="242" name="Shape 242"/>
         <p:cNvGrpSpPr/>
         <p:nvPr/>
       </p:nvGrpSpPr>
@@ -20072,7 +20072,7 @@
       </p:grpSpPr>
       <p:sp>
         <p:nvSpPr>
-          <p:cNvPr id="242" name="Google Shape;242;p36"/>
+          <p:cNvPr id="243" name="Google Shape;243;p36"/>
           <p:cNvSpPr txBox="1"/>
           <p:nvPr>
             <p:ph type="title"/>
@@ -20130,7 +20130,7 @@
       </p:sp>
       <p:sp>
         <p:nvSpPr>
-          <p:cNvPr id="243" name="Google Shape;243;p36"/>
+          <p:cNvPr id="244" name="Google Shape;244;p36"/>
           <p:cNvSpPr txBox="1"/>
           <p:nvPr>
             <p:ph idx="1" type="body"/>
@@ -20345,7 +20345,7 @@
       </p:sp>
       <p:pic>
         <p:nvPicPr>
-          <p:cNvPr id="244" name="Google Shape;244;p36"/>
+          <p:cNvPr id="245" name="Google Shape;245;p36"/>
           <p:cNvPicPr preferRelativeResize="0"/>
           <p:nvPr/>
         </p:nvPicPr>
@@ -20389,7 +20389,7 @@
   <p:cSld>
     <p:spTree>
       <p:nvGrpSpPr>
-        <p:cNvPr id="249" name="Shape 249"/>
+        <p:cNvPr id="250" name="Shape 250"/>
         <p:cNvGrpSpPr/>
         <p:nvPr/>
       </p:nvGrpSpPr>
@@ -20403,7 +20403,7 @@
       </p:grpSpPr>
       <p:sp>
         <p:nvSpPr>
-          <p:cNvPr id="250" name="Google Shape;250;p37"/>
+          <p:cNvPr id="251" name="Google Shape;251;p37"/>
           <p:cNvSpPr txBox="1"/>
           <p:nvPr>
             <p:ph type="title"/>
@@ -20461,7 +20461,7 @@
       </p:sp>
       <p:sp>
         <p:nvSpPr>
-          <p:cNvPr id="251" name="Google Shape;251;p37"/>
+          <p:cNvPr id="252" name="Google Shape;252;p37"/>
           <p:cNvSpPr txBox="1"/>
           <p:nvPr>
             <p:ph idx="1" type="body"/>
@@ -20630,7 +20630,7 @@
       </p:sp>
       <p:pic>
         <p:nvPicPr>
-          <p:cNvPr id="252" name="Google Shape;252;p37"/>
+          <p:cNvPr id="253" name="Google Shape;253;p37"/>
           <p:cNvPicPr preferRelativeResize="0"/>
           <p:nvPr/>
         </p:nvPicPr>
@@ -22071,7 +22071,7 @@
                 <a:sym typeface="Open Sans"/>
                 <a:hlinkClick r:id="rId3"/>
               </a:rPr>
-              <a:t>https://github.com/danilofreire/economia-politica-instituicoes-ufm</a:t>
+              <a:t>https://github.com/danilofreire/omma</a:t>
             </a:r>
             <a:r>
               <a:rPr lang="en-US" sz="2400">
@@ -22124,6 +22124,34 @@
           </a:ln>
         </p:spPr>
       </p:pic>
+      <p:pic>
+        <p:nvPicPr>
+          <p:cNvPr id="107" name="Google Shape;107;p19"/>
+          <p:cNvPicPr preferRelativeResize="0"/>
+          <p:nvPr/>
+        </p:nvPicPr>
+        <p:blipFill>
+          <a:blip r:embed="rId5">
+            <a:alphaModFix/>
+          </a:blip>
+          <a:stretch>
+            <a:fillRect/>
+          </a:stretch>
+        </p:blipFill>
+        <p:spPr>
+          <a:xfrm>
+            <a:off x="922350" y="2361550"/>
+            <a:ext cx="7299299" cy="3402400"/>
+          </a:xfrm>
+          <a:prstGeom prst="rect">
+            <a:avLst/>
+          </a:prstGeom>
+          <a:noFill/>
+          <a:ln>
+            <a:noFill/>
+          </a:ln>
+        </p:spPr>
+      </p:pic>
     </p:spTree>
   </p:cSld>
   <p:clrMapOvr>
@@ -22137,7 +22165,7 @@
   <p:cSld>
     <p:spTree>
       <p:nvGrpSpPr>
-        <p:cNvPr id="111" name="Shape 111"/>
+        <p:cNvPr id="112" name="Shape 112"/>
         <p:cNvGrpSpPr/>
         <p:nvPr/>
       </p:nvGrpSpPr>
@@ -22151,7 +22179,7 @@
       </p:grpSpPr>
       <p:sp>
         <p:nvSpPr>
-          <p:cNvPr id="112" name="Google Shape;112;p20"/>
+          <p:cNvPr id="113" name="Google Shape;113;p20"/>
           <p:cNvSpPr txBox="1"/>
           <p:nvPr>
             <p:ph type="title"/>
@@ -22209,7 +22237,7 @@
       </p:sp>
       <p:sp>
         <p:nvSpPr>
-          <p:cNvPr id="113" name="Google Shape;113;p20"/>
+          <p:cNvPr id="114" name="Google Shape;114;p20"/>
           <p:cNvSpPr txBox="1"/>
           <p:nvPr>
             <p:ph idx="1" type="body"/>
@@ -22454,7 +22482,7 @@
       </p:sp>
       <p:pic>
         <p:nvPicPr>
-          <p:cNvPr id="114" name="Google Shape;114;p20"/>
+          <p:cNvPr id="115" name="Google Shape;115;p20"/>
           <p:cNvPicPr preferRelativeResize="0"/>
           <p:nvPr/>
         </p:nvPicPr>
@@ -22498,7 +22526,7 @@
   <p:cSld>
     <p:spTree>
       <p:nvGrpSpPr>
-        <p:cNvPr id="119" name="Shape 119"/>
+        <p:cNvPr id="120" name="Shape 120"/>
         <p:cNvGrpSpPr/>
         <p:nvPr/>
       </p:nvGrpSpPr>
@@ -22512,7 +22540,7 @@
       </p:grpSpPr>
       <p:sp>
         <p:nvSpPr>
-          <p:cNvPr id="120" name="Google Shape;120;p21"/>
+          <p:cNvPr id="121" name="Google Shape;121;p21"/>
           <p:cNvSpPr txBox="1"/>
           <p:nvPr>
             <p:ph type="title"/>
@@ -22570,7 +22598,7 @@
       </p:sp>
       <p:sp>
         <p:nvSpPr>
-          <p:cNvPr id="121" name="Google Shape;121;p21"/>
+          <p:cNvPr id="122" name="Google Shape;122;p21"/>
           <p:cNvSpPr txBox="1"/>
           <p:nvPr>
             <p:ph idx="1" type="body"/>
@@ -22814,7 +22842,7 @@
       </p:sp>
       <p:pic>
         <p:nvPicPr>
-          <p:cNvPr descr="Norman_P._Barry.jpg" id="122" name="Google Shape;122;p21"/>
+          <p:cNvPr descr="Norman_P._Barry.jpg" id="123" name="Google Shape;123;p21"/>
           <p:cNvPicPr preferRelativeResize="0"/>
           <p:nvPr/>
         </p:nvPicPr>
@@ -22841,7 +22869,7 @@
       </p:pic>
       <p:pic>
         <p:nvPicPr>
-          <p:cNvPr id="123" name="Google Shape;123;p21"/>
+          <p:cNvPr id="124" name="Google Shape;124;p21"/>
           <p:cNvPicPr preferRelativeResize="0"/>
           <p:nvPr/>
         </p:nvPicPr>
@@ -22885,7 +22913,7 @@
   <p:cSld>
     <p:spTree>
       <p:nvGrpSpPr>
-        <p:cNvPr id="128" name="Shape 128"/>
+        <p:cNvPr id="129" name="Shape 129"/>
         <p:cNvGrpSpPr/>
         <p:nvPr/>
       </p:nvGrpSpPr>
@@ -22899,7 +22927,7 @@
       </p:grpSpPr>
       <p:sp>
         <p:nvSpPr>
-          <p:cNvPr id="129" name="Google Shape;129;p22"/>
+          <p:cNvPr id="130" name="Google Shape;130;p22"/>
           <p:cNvSpPr txBox="1"/>
           <p:nvPr>
             <p:ph type="title"/>
@@ -22957,7 +22985,7 @@
       </p:sp>
       <p:sp>
         <p:nvSpPr>
-          <p:cNvPr id="130" name="Google Shape;130;p22"/>
+          <p:cNvPr id="131" name="Google Shape;131;p22"/>
           <p:cNvSpPr txBox="1"/>
           <p:nvPr>
             <p:ph idx="1" type="body"/>
@@ -23241,7 +23269,7 @@
       </p:sp>
       <p:pic>
         <p:nvPicPr>
-          <p:cNvPr id="131" name="Google Shape;131;p22"/>
+          <p:cNvPr id="132" name="Google Shape;132;p22"/>
           <p:cNvPicPr preferRelativeResize="0"/>
           <p:nvPr/>
         </p:nvPicPr>

</xml_diff>